<commit_message>
Added info to parallel programming talk
</commit_message>
<xml_diff>
--- a/Basics_Supercomputing/how_parallel_program.pptx
+++ b/Basics_Supercomputing/how_parallel_program.pptx
@@ -9,10 +9,10 @@
     <p:sldMasterId id="2147483805" r:id="rId5"/>
   </p:sldMasterIdLst>
   <p:notesMasterIdLst>
-    <p:notesMasterId r:id="rId42"/>
+    <p:notesMasterId r:id="rId43"/>
   </p:notesMasterIdLst>
   <p:handoutMasterIdLst>
-    <p:handoutMasterId r:id="rId43"/>
+    <p:handoutMasterId r:id="rId44"/>
   </p:handoutMasterIdLst>
   <p:sldIdLst>
     <p:sldId id="312" r:id="rId6"/>
@@ -50,7 +50,8 @@
     <p:sldId id="425" r:id="rId38"/>
     <p:sldId id="430" r:id="rId39"/>
     <p:sldId id="399" r:id="rId40"/>
-    <p:sldId id="406" r:id="rId41"/>
+    <p:sldId id="436" r:id="rId41"/>
+    <p:sldId id="406" r:id="rId42"/>
   </p:sldIdLst>
   <p:sldSz cx="9144000" cy="6858000" type="screen4x3"/>
   <p:notesSz cx="6858000" cy="9144000"/>
@@ -23752,11 +23753,11 @@
   <p:clrMapOvr>
     <a:masterClrMapping/>
   </p:clrMapOvr>
-  <mc:AlternateContent xmlns:mc="http://schemas.openxmlformats.org/markup-compatibility/2006">
-    <mc:Choice xmlns:p14="http://schemas.microsoft.com/office/powerpoint/2010/main" Requires="p14">
+  <mc:AlternateContent xmlns:mc="http://schemas.openxmlformats.org/markup-compatibility/2006" xmlns:p14="http://schemas.microsoft.com/office/powerpoint/2010/main">
+    <mc:Choice Requires="p14">
       <p:transition spd="slow" p14:dur="2000"/>
     </mc:Choice>
-    <mc:Fallback>
+    <mc:Fallback xmlns="">
       <p:transition spd="slow"/>
     </mc:Fallback>
   </mc:AlternateContent>
@@ -24139,11 +24140,11 @@
   <p:clrMapOvr>
     <a:masterClrMapping/>
   </p:clrMapOvr>
-  <mc:AlternateContent xmlns:mc="http://schemas.openxmlformats.org/markup-compatibility/2006">
-    <mc:Choice xmlns:p14="http://schemas.microsoft.com/office/powerpoint/2010/main" Requires="p14">
+  <mc:AlternateContent xmlns:mc="http://schemas.openxmlformats.org/markup-compatibility/2006" xmlns:p14="http://schemas.microsoft.com/office/powerpoint/2010/main">
+    <mc:Choice Requires="p14">
       <p:transition spd="slow" p14:dur="2000"/>
     </mc:Choice>
-    <mc:Fallback>
+    <mc:Fallback xmlns="">
       <p:transition spd="slow"/>
     </mc:Fallback>
   </mc:AlternateContent>
@@ -24291,11 +24292,11 @@
   <p:clrMapOvr>
     <a:masterClrMapping/>
   </p:clrMapOvr>
-  <mc:AlternateContent xmlns:mc="http://schemas.openxmlformats.org/markup-compatibility/2006">
-    <mc:Choice xmlns:p14="http://schemas.microsoft.com/office/powerpoint/2010/main" Requires="p14">
+  <mc:AlternateContent xmlns:mc="http://schemas.openxmlformats.org/markup-compatibility/2006" xmlns:p14="http://schemas.microsoft.com/office/powerpoint/2010/main">
+    <mc:Choice Requires="p14">
       <p:transition spd="slow" p14:dur="2000"/>
     </mc:Choice>
-    <mc:Fallback>
+    <mc:Fallback xmlns="">
       <p:transition spd="slow"/>
     </mc:Fallback>
   </mc:AlternateContent>
@@ -24462,11 +24463,11 @@
   <p:clrMapOvr>
     <a:masterClrMapping/>
   </p:clrMapOvr>
-  <mc:AlternateContent xmlns:mc="http://schemas.openxmlformats.org/markup-compatibility/2006">
-    <mc:Choice xmlns:p14="http://schemas.microsoft.com/office/powerpoint/2010/main" Requires="p14">
+  <mc:AlternateContent xmlns:mc="http://schemas.openxmlformats.org/markup-compatibility/2006" xmlns:p14="http://schemas.microsoft.com/office/powerpoint/2010/main">
+    <mc:Choice Requires="p14">
       <p:transition spd="slow" p14:dur="2000"/>
     </mc:Choice>
-    <mc:Fallback>
+    <mc:Fallback xmlns="">
       <p:transition spd="slow"/>
     </mc:Fallback>
   </mc:AlternateContent>
@@ -27441,7 +27442,7 @@
           <a:p>
             <a:r>
               <a:rPr lang="en-US" dirty="0" smtClean="0"/>
-              <a:t>Questions?</a:t>
+              <a:t>Now what?</a:t>
             </a:r>
             <a:endParaRPr lang="en-US" dirty="0"/>
           </a:p>
@@ -27461,6 +27462,12 @@
         <p:txBody>
           <a:bodyPr/>
           <a:lstStyle/>
+          <a:p>
+            <a:r>
+              <a:rPr lang="en-US" dirty="0" smtClean="0"/>
+              <a:t>Get an account on Janus!</a:t>
+            </a:r>
+          </a:p>
           <a:p>
             <a:r>
               <a:rPr lang="en-US" dirty="0" smtClean="0"/>
@@ -27472,6 +27479,154 @@
               </a:rPr>
               <a:t>rc-help@colorado.edu</a:t>
             </a:r>
+            <a:r>
+              <a:rPr lang="en-US" dirty="0" smtClean="0"/>
+              <a:t> for any help!</a:t>
+            </a:r>
+          </a:p>
+          <a:p>
+            <a:r>
+              <a:rPr lang="en-US" dirty="0" smtClean="0"/>
+              <a:t>Email </a:t>
+            </a:r>
+            <a:r>
+              <a:rPr lang="en-US" dirty="0" smtClean="0">
+                <a:hlinkClick r:id="rId3"/>
+              </a:rPr>
+              <a:t>shelley.knuth@colorado.edu</a:t>
+            </a:r>
+            <a:r>
+              <a:rPr lang="en-US" dirty="0" smtClean="0"/>
+              <a:t> if you want to be added to a new email list about upcoming workshops!</a:t>
+            </a:r>
+          </a:p>
+          <a:p>
+            <a:r>
+              <a:rPr lang="en-US" dirty="0" smtClean="0"/>
+              <a:t>Fill this out! </a:t>
+            </a:r>
+            <a:r>
+              <a:rPr lang="en-US" dirty="0">
+                <a:hlinkClick r:id="rId4"/>
+              </a:rPr>
+              <a:t>http://tinyurl.com/curc-survey16</a:t>
+            </a:r>
+            <a:r>
+              <a:rPr lang="en-US" dirty="0"/>
+              <a:t>  </a:t>
+            </a:r>
+          </a:p>
+          <a:p>
+            <a:r>
+              <a:rPr lang="en-US" smtClean="0"/>
+              <a:t> </a:t>
+            </a:r>
+            <a:endParaRPr lang="en-US" dirty="0"/>
+          </a:p>
+        </p:txBody>
+      </p:sp>
+      <p:sp>
+        <p:nvSpPr>
+          <p:cNvPr id="4" name="Slide Number Placeholder 3"/>
+          <p:cNvSpPr>
+            <a:spLocks noGrp="1"/>
+          </p:cNvSpPr>
+          <p:nvPr>
+            <p:ph type="sldNum" sz="quarter" idx="4"/>
+          </p:nvPr>
+        </p:nvSpPr>
+        <p:spPr/>
+        <p:txBody>
+          <a:bodyPr/>
+          <a:lstStyle/>
+          <a:p>
+            <a:fld id="{249E94F7-107C-CE46-8C56-9CACFF99CD93}" type="slidenum">
+              <a:rPr lang="en-US" smtClean="0"/>
+              <a:pPr/>
+              <a:t>36</a:t>
+            </a:fld>
+            <a:endParaRPr lang="en-US" dirty="0"/>
+          </a:p>
+        </p:txBody>
+      </p:sp>
+    </p:spTree>
+    <p:extLst>
+      <p:ext uri="{BB962C8B-B14F-4D97-AF65-F5344CB8AC3E}">
+        <p14:creationId xmlns:p14="http://schemas.microsoft.com/office/powerpoint/2010/main" val="413745299"/>
+      </p:ext>
+    </p:extLst>
+  </p:cSld>
+  <p:clrMapOvr>
+    <a:masterClrMapping/>
+  </p:clrMapOvr>
+</p:sld>
+</file>
+
+<file path=ppt/slides/slide37.xml><?xml version="1.0" encoding="utf-8"?>
+<p:sld xmlns:a="http://schemas.openxmlformats.org/drawingml/2006/main" xmlns:r="http://schemas.openxmlformats.org/officeDocument/2006/relationships" xmlns:p="http://schemas.openxmlformats.org/presentationml/2006/main">
+  <p:cSld>
+    <p:spTree>
+      <p:nvGrpSpPr>
+        <p:cNvPr id="1" name=""/>
+        <p:cNvGrpSpPr/>
+        <p:nvPr/>
+      </p:nvGrpSpPr>
+      <p:grpSpPr>
+        <a:xfrm>
+          <a:off x="0" y="0"/>
+          <a:ext cx="0" cy="0"/>
+          <a:chOff x="0" y="0"/>
+          <a:chExt cx="0" cy="0"/>
+        </a:xfrm>
+      </p:grpSpPr>
+      <p:sp>
+        <p:nvSpPr>
+          <p:cNvPr id="2" name="Title 1"/>
+          <p:cNvSpPr>
+            <a:spLocks noGrp="1"/>
+          </p:cNvSpPr>
+          <p:nvPr>
+            <p:ph type="title"/>
+          </p:nvPr>
+        </p:nvSpPr>
+        <p:spPr/>
+        <p:txBody>
+          <a:bodyPr/>
+          <a:lstStyle/>
+          <a:p>
+            <a:r>
+              <a:rPr lang="en-US" dirty="0" smtClean="0"/>
+              <a:t>Questions?</a:t>
+            </a:r>
+            <a:endParaRPr lang="en-US" dirty="0"/>
+          </a:p>
+        </p:txBody>
+      </p:sp>
+      <p:sp>
+        <p:nvSpPr>
+          <p:cNvPr id="3" name="Content Placeholder 2"/>
+          <p:cNvSpPr>
+            <a:spLocks noGrp="1"/>
+          </p:cNvSpPr>
+          <p:nvPr>
+            <p:ph idx="1"/>
+          </p:nvPr>
+        </p:nvSpPr>
+        <p:spPr/>
+        <p:txBody>
+          <a:bodyPr/>
+          <a:lstStyle/>
+          <a:p>
+            <a:r>
+              <a:rPr lang="en-US" dirty="0" smtClean="0"/>
+              <a:t>Email </a:t>
+            </a:r>
+            <a:r>
+              <a:rPr lang="en-US" dirty="0" smtClean="0">
+                <a:hlinkClick r:id="rId2"/>
+              </a:rPr>
+              <a:t>rc-help@colorado.edu</a:t>
+            </a:r>
             <a:endParaRPr lang="en-US" dirty="0" smtClean="0"/>
           </a:p>
           <a:p>
@@ -27610,7 +27765,7 @@
             <a:fld id="{249E94F7-107C-CE46-8C56-9CACFF99CD93}" type="slidenum">
               <a:rPr lang="en-US" smtClean="0"/>
               <a:pPr/>
-              <a:t>36</a:t>
+              <a:t>37</a:t>
             </a:fld>
             <a:endParaRPr lang="en-US" dirty="0"/>
           </a:p>

</xml_diff>